<commit_message>
commit btc bnb data from 3-1-2019 to 26-10-2022
</commit_message>
<xml_diff>
--- a/Presentation.pptx
+++ b/Presentation.pptx
@@ -5,12 +5,13 @@
     <p:sldMasterId id="2147483648" r:id="rId1"/>
   </p:sldMasterIdLst>
   <p:notesMasterIdLst>
-    <p:notesMasterId r:id="rId5"/>
+    <p:notesMasterId r:id="rId6"/>
   </p:notesMasterIdLst>
   <p:sldIdLst>
     <p:sldId id="256" r:id="rId2"/>
     <p:sldId id="257" r:id="rId3"/>
     <p:sldId id="258" r:id="rId4"/>
+    <p:sldId id="259" r:id="rId5"/>
   </p:sldIdLst>
   <p:sldSz cx="12192000" cy="6858000"/>
   <p:notesSz cx="6858000" cy="9144000"/>
@@ -109,6 +110,11 @@
       </a:defRPr>
     </a:lvl9pPr>
   </p:defaultTextStyle>
+  <p:extLst>
+    <p:ext uri="{EFAFB233-063F-42B5-8137-9DF3F51BA10A}">
+      <p15:sldGuideLst xmlns:p15="http://schemas.microsoft.com/office/powerpoint/2012/main"/>
+    </p:ext>
+  </p:extLst>
 </p:presentation>
 </file>
 
@@ -194,7 +200,7 @@
           <a:p>
             <a:fld id="{732DA226-17C0-408D-A41F-E8091E262BB0}" type="datetimeFigureOut">
               <a:rPr lang="en-AU" smtClean="0"/>
-              <a:t>26/10/2022</a:t>
+              <a:t>27/10/2022</a:t>
             </a:fld>
             <a:endParaRPr lang="en-AU"/>
           </a:p>
@@ -725,7 +731,7 @@
           <a:p>
             <a:fld id="{12A724B5-2D60-411B-A104-D6B0EC565BD0}" type="datetimeFigureOut">
               <a:rPr lang="en-AU" smtClean="0"/>
-              <a:t>26/10/2022</a:t>
+              <a:t>27/10/2022</a:t>
             </a:fld>
             <a:endParaRPr lang="en-AU"/>
           </a:p>
@@ -925,7 +931,7 @@
           <a:p>
             <a:fld id="{12A724B5-2D60-411B-A104-D6B0EC565BD0}" type="datetimeFigureOut">
               <a:rPr lang="en-AU" smtClean="0"/>
-              <a:t>26/10/2022</a:t>
+              <a:t>27/10/2022</a:t>
             </a:fld>
             <a:endParaRPr lang="en-AU"/>
           </a:p>
@@ -1135,7 +1141,7 @@
           <a:p>
             <a:fld id="{12A724B5-2D60-411B-A104-D6B0EC565BD0}" type="datetimeFigureOut">
               <a:rPr lang="en-AU" smtClean="0"/>
-              <a:t>26/10/2022</a:t>
+              <a:t>27/10/2022</a:t>
             </a:fld>
             <a:endParaRPr lang="en-AU"/>
           </a:p>
@@ -1335,7 +1341,7 @@
           <a:p>
             <a:fld id="{12A724B5-2D60-411B-A104-D6B0EC565BD0}" type="datetimeFigureOut">
               <a:rPr lang="en-AU" smtClean="0"/>
-              <a:t>26/10/2022</a:t>
+              <a:t>27/10/2022</a:t>
             </a:fld>
             <a:endParaRPr lang="en-AU"/>
           </a:p>
@@ -1611,7 +1617,7 @@
           <a:p>
             <a:fld id="{12A724B5-2D60-411B-A104-D6B0EC565BD0}" type="datetimeFigureOut">
               <a:rPr lang="en-AU" smtClean="0"/>
-              <a:t>26/10/2022</a:t>
+              <a:t>27/10/2022</a:t>
             </a:fld>
             <a:endParaRPr lang="en-AU"/>
           </a:p>
@@ -1879,7 +1885,7 @@
           <a:p>
             <a:fld id="{12A724B5-2D60-411B-A104-D6B0EC565BD0}" type="datetimeFigureOut">
               <a:rPr lang="en-AU" smtClean="0"/>
-              <a:t>26/10/2022</a:t>
+              <a:t>27/10/2022</a:t>
             </a:fld>
             <a:endParaRPr lang="en-AU"/>
           </a:p>
@@ -2294,7 +2300,7 @@
           <a:p>
             <a:fld id="{12A724B5-2D60-411B-A104-D6B0EC565BD0}" type="datetimeFigureOut">
               <a:rPr lang="en-AU" smtClean="0"/>
-              <a:t>26/10/2022</a:t>
+              <a:t>27/10/2022</a:t>
             </a:fld>
             <a:endParaRPr lang="en-AU"/>
           </a:p>
@@ -2436,7 +2442,7 @@
           <a:p>
             <a:fld id="{12A724B5-2D60-411B-A104-D6B0EC565BD0}" type="datetimeFigureOut">
               <a:rPr lang="en-AU" smtClean="0"/>
-              <a:t>26/10/2022</a:t>
+              <a:t>27/10/2022</a:t>
             </a:fld>
             <a:endParaRPr lang="en-AU"/>
           </a:p>
@@ -2549,7 +2555,7 @@
           <a:p>
             <a:fld id="{12A724B5-2D60-411B-A104-D6B0EC565BD0}" type="datetimeFigureOut">
               <a:rPr lang="en-AU" smtClean="0"/>
-              <a:t>26/10/2022</a:t>
+              <a:t>27/10/2022</a:t>
             </a:fld>
             <a:endParaRPr lang="en-AU"/>
           </a:p>
@@ -2862,7 +2868,7 @@
           <a:p>
             <a:fld id="{12A724B5-2D60-411B-A104-D6B0EC565BD0}" type="datetimeFigureOut">
               <a:rPr lang="en-AU" smtClean="0"/>
-              <a:t>26/10/2022</a:t>
+              <a:t>27/10/2022</a:t>
             </a:fld>
             <a:endParaRPr lang="en-AU"/>
           </a:p>
@@ -3151,7 +3157,7 @@
           <a:p>
             <a:fld id="{12A724B5-2D60-411B-A104-D6B0EC565BD0}" type="datetimeFigureOut">
               <a:rPr lang="en-AU" smtClean="0"/>
-              <a:t>26/10/2022</a:t>
+              <a:t>27/10/2022</a:t>
             </a:fld>
             <a:endParaRPr lang="en-AU"/>
           </a:p>
@@ -3394,7 +3400,7 @@
           <a:p>
             <a:fld id="{12A724B5-2D60-411B-A104-D6B0EC565BD0}" type="datetimeFigureOut">
               <a:rPr lang="en-AU" smtClean="0"/>
-              <a:t>26/10/2022</a:t>
+              <a:t>27/10/2022</a:t>
             </a:fld>
             <a:endParaRPr lang="en-AU"/>
           </a:p>
@@ -3914,7 +3920,7 @@
           <a:p>
             <a:r>
               <a:rPr lang="en-US" altLang="zh-CN" dirty="0" err="1"/>
-              <a:t>Critirias</a:t>
+              <a:t>Criterias</a:t>
             </a:r>
             <a:r>
               <a:rPr lang="en-US" altLang="zh-CN" dirty="0"/>
@@ -4076,12 +4082,139 @@
               <a:t>Save to csv file from google sheet</a:t>
             </a:r>
           </a:p>
+          <a:p>
+            <a:r>
+              <a:rPr lang="en-AU" dirty="0"/>
+              <a:t>Data time range: </a:t>
+            </a:r>
+          </a:p>
+          <a:p>
+            <a:pPr lvl="1"/>
+            <a:r>
+              <a:rPr lang="en-AU" dirty="0"/>
+              <a:t>From </a:t>
+            </a:r>
+            <a:r>
+              <a:rPr lang="en-AU" b="0" i="0" dirty="0">
+                <a:solidFill>
+                  <a:srgbClr val="1D1C1D"/>
+                </a:solidFill>
+                <a:effectLst/>
+                <a:latin typeface="Slack-Lato"/>
+              </a:rPr>
+              <a:t>3-1-2009 (when bitcoin started) to 26-10-2022</a:t>
+            </a:r>
+          </a:p>
+          <a:p>
+            <a:pPr lvl="1"/>
+            <a:endParaRPr lang="en-AU" dirty="0">
+              <a:solidFill>
+                <a:srgbClr val="1D1C1D"/>
+              </a:solidFill>
+              <a:latin typeface="Slack-Lato"/>
+            </a:endParaRPr>
+          </a:p>
+          <a:p>
+            <a:pPr lvl="1"/>
+            <a:endParaRPr lang="en-AU">
+              <a:solidFill>
+                <a:srgbClr val="1D1C1D"/>
+              </a:solidFill>
+              <a:latin typeface="Slack-Lato"/>
+            </a:endParaRPr>
+          </a:p>
         </p:txBody>
       </p:sp>
     </p:spTree>
     <p:extLst>
       <p:ext uri="{BB962C8B-B14F-4D97-AF65-F5344CB8AC3E}">
         <p14:creationId xmlns:p14="http://schemas.microsoft.com/office/powerpoint/2010/main" val="923647400"/>
+      </p:ext>
+    </p:extLst>
+  </p:cSld>
+  <p:clrMapOvr>
+    <a:masterClrMapping/>
+  </p:clrMapOvr>
+</p:sld>
+</file>
+
+<file path=ppt/slides/slide4.xml><?xml version="1.0" encoding="utf-8"?>
+<p:sld xmlns:a="http://schemas.openxmlformats.org/drawingml/2006/main" xmlns:r="http://schemas.openxmlformats.org/officeDocument/2006/relationships" xmlns:p="http://schemas.openxmlformats.org/presentationml/2006/main">
+  <p:cSld>
+    <p:spTree>
+      <p:nvGrpSpPr>
+        <p:cNvPr id="1" name=""/>
+        <p:cNvGrpSpPr/>
+        <p:nvPr/>
+      </p:nvGrpSpPr>
+      <p:grpSpPr>
+        <a:xfrm>
+          <a:off x="0" y="0"/>
+          <a:ext cx="0" cy="0"/>
+          <a:chOff x="0" y="0"/>
+          <a:chExt cx="0" cy="0"/>
+        </a:xfrm>
+      </p:grpSpPr>
+      <p:sp>
+        <p:nvSpPr>
+          <p:cNvPr id="2" name="Title 1">
+            <a:extLst>
+              <a:ext uri="{FF2B5EF4-FFF2-40B4-BE49-F238E27FC236}">
+                <a16:creationId xmlns:a16="http://schemas.microsoft.com/office/drawing/2014/main" id="{FB8707D7-2A7B-D47F-AF5E-F66A28412721}"/>
+              </a:ext>
+            </a:extLst>
+          </p:cNvPr>
+          <p:cNvSpPr>
+            <a:spLocks noGrp="1"/>
+          </p:cNvSpPr>
+          <p:nvPr>
+            <p:ph type="title"/>
+          </p:nvPr>
+        </p:nvSpPr>
+        <p:spPr/>
+        <p:txBody>
+          <a:bodyPr/>
+          <a:lstStyle/>
+          <a:p>
+            <a:r>
+              <a:rPr lang="en-AU" dirty="0"/>
+              <a:t>Assumptions</a:t>
+            </a:r>
+          </a:p>
+        </p:txBody>
+      </p:sp>
+      <p:sp>
+        <p:nvSpPr>
+          <p:cNvPr id="3" name="Content Placeholder 2">
+            <a:extLst>
+              <a:ext uri="{FF2B5EF4-FFF2-40B4-BE49-F238E27FC236}">
+                <a16:creationId xmlns:a16="http://schemas.microsoft.com/office/drawing/2014/main" id="{0A0373E8-2504-0125-38DE-447A62876E23}"/>
+              </a:ext>
+            </a:extLst>
+          </p:cNvPr>
+          <p:cNvSpPr>
+            <a:spLocks noGrp="1"/>
+          </p:cNvSpPr>
+          <p:nvPr>
+            <p:ph idx="1"/>
+          </p:nvPr>
+        </p:nvSpPr>
+        <p:spPr/>
+        <p:txBody>
+          <a:bodyPr/>
+          <a:lstStyle/>
+          <a:p>
+            <a:r>
+              <a:rPr lang="en-AU" dirty="0"/>
+              <a:t>Note that Monta Carlo Simulation applies to normal distribution, and the price of cryptos may fluctuate dramatically and the distribution may not be normal distribution</a:t>
+            </a:r>
+          </a:p>
+        </p:txBody>
+      </p:sp>
+    </p:spTree>
+    <p:extLst>
+      <p:ext uri="{BB962C8B-B14F-4D97-AF65-F5344CB8AC3E}">
+        <p14:creationId xmlns:p14="http://schemas.microsoft.com/office/powerpoint/2010/main" val="398941835"/>
       </p:ext>
     </p:extLst>
   </p:cSld>

</xml_diff>

<commit_message>
combine all the daily returns of the 6 cryptos to flora_zhao branch
</commit_message>
<xml_diff>
--- a/Presentation.pptx
+++ b/Presentation.pptx
@@ -5,13 +5,14 @@
     <p:sldMasterId id="2147483648" r:id="rId1"/>
   </p:sldMasterIdLst>
   <p:notesMasterIdLst>
-    <p:notesMasterId r:id="rId6"/>
+    <p:notesMasterId r:id="rId7"/>
   </p:notesMasterIdLst>
   <p:sldIdLst>
     <p:sldId id="256" r:id="rId2"/>
     <p:sldId id="257" r:id="rId3"/>
     <p:sldId id="258" r:id="rId4"/>
     <p:sldId id="259" r:id="rId5"/>
+    <p:sldId id="260" r:id="rId6"/>
   </p:sldIdLst>
   <p:sldSz cx="12192000" cy="6858000"/>
   <p:notesSz cx="6858000" cy="9144000"/>
@@ -200,7 +201,7 @@
           <a:p>
             <a:fld id="{732DA226-17C0-408D-A41F-E8091E262BB0}" type="datetimeFigureOut">
               <a:rPr lang="en-AU" smtClean="0"/>
-              <a:t>27/10/2022</a:t>
+              <a:t>31/10/2022</a:t>
             </a:fld>
             <a:endParaRPr lang="en-AU"/>
           </a:p>
@@ -582,6 +583,90 @@
 </p:notes>
 </file>
 
+<file path=ppt/notesSlides/notesSlide2.xml><?xml version="1.0" encoding="utf-8"?>
+<p:notes xmlns:a="http://schemas.openxmlformats.org/drawingml/2006/main" xmlns:r="http://schemas.openxmlformats.org/officeDocument/2006/relationships" xmlns:p="http://schemas.openxmlformats.org/presentationml/2006/main">
+  <p:cSld>
+    <p:spTree>
+      <p:nvGrpSpPr>
+        <p:cNvPr id="1" name=""/>
+        <p:cNvGrpSpPr/>
+        <p:nvPr/>
+      </p:nvGrpSpPr>
+      <p:grpSpPr>
+        <a:xfrm>
+          <a:off x="0" y="0"/>
+          <a:ext cx="0" cy="0"/>
+          <a:chOff x="0" y="0"/>
+          <a:chExt cx="0" cy="0"/>
+        </a:xfrm>
+      </p:grpSpPr>
+      <p:sp>
+        <p:nvSpPr>
+          <p:cNvPr id="2" name="Slide Image Placeholder 1"/>
+          <p:cNvSpPr>
+            <a:spLocks noGrp="1" noRot="1" noChangeAspect="1"/>
+          </p:cNvSpPr>
+          <p:nvPr>
+            <p:ph type="sldImg"/>
+          </p:nvPr>
+        </p:nvSpPr>
+        <p:spPr/>
+      </p:sp>
+      <p:sp>
+        <p:nvSpPr>
+          <p:cNvPr id="3" name="Notes Placeholder 2"/>
+          <p:cNvSpPr>
+            <a:spLocks noGrp="1"/>
+          </p:cNvSpPr>
+          <p:nvPr>
+            <p:ph type="body" idx="1"/>
+          </p:nvPr>
+        </p:nvSpPr>
+        <p:spPr/>
+        <p:txBody>
+          <a:bodyPr/>
+          <a:lstStyle/>
+          <a:p>
+            <a:endParaRPr lang="en-AU" dirty="0"/>
+          </a:p>
+        </p:txBody>
+      </p:sp>
+      <p:sp>
+        <p:nvSpPr>
+          <p:cNvPr id="4" name="Slide Number Placeholder 3"/>
+          <p:cNvSpPr>
+            <a:spLocks noGrp="1"/>
+          </p:cNvSpPr>
+          <p:nvPr>
+            <p:ph type="sldNum" sz="quarter" idx="5"/>
+          </p:nvPr>
+        </p:nvSpPr>
+        <p:spPr/>
+        <p:txBody>
+          <a:bodyPr/>
+          <a:lstStyle/>
+          <a:p>
+            <a:fld id="{264BFFA1-F1B6-4331-99F4-5B66C3E7D121}" type="slidenum">
+              <a:rPr lang="en-AU" smtClean="0"/>
+              <a:t>5</a:t>
+            </a:fld>
+            <a:endParaRPr lang="en-AU"/>
+          </a:p>
+        </p:txBody>
+      </p:sp>
+    </p:spTree>
+    <p:extLst>
+      <p:ext uri="{BB962C8B-B14F-4D97-AF65-F5344CB8AC3E}">
+        <p14:creationId xmlns:p14="http://schemas.microsoft.com/office/powerpoint/2010/main" val="2274211861"/>
+      </p:ext>
+    </p:extLst>
+  </p:cSld>
+  <p:clrMapOvr>
+    <a:masterClrMapping/>
+  </p:clrMapOvr>
+</p:notes>
+</file>
+
 <file path=ppt/slideLayouts/slideLayout1.xml><?xml version="1.0" encoding="utf-8"?>
 <p:sldLayout xmlns:a="http://schemas.openxmlformats.org/drawingml/2006/main" xmlns:r="http://schemas.openxmlformats.org/officeDocument/2006/relationships" xmlns:p="http://schemas.openxmlformats.org/presentationml/2006/main" type="title" preserve="1">
   <p:cSld name="Title Slide">
@@ -731,7 +816,7 @@
           <a:p>
             <a:fld id="{12A724B5-2D60-411B-A104-D6B0EC565BD0}" type="datetimeFigureOut">
               <a:rPr lang="en-AU" smtClean="0"/>
-              <a:t>27/10/2022</a:t>
+              <a:t>31/10/2022</a:t>
             </a:fld>
             <a:endParaRPr lang="en-AU"/>
           </a:p>
@@ -931,7 +1016,7 @@
           <a:p>
             <a:fld id="{12A724B5-2D60-411B-A104-D6B0EC565BD0}" type="datetimeFigureOut">
               <a:rPr lang="en-AU" smtClean="0"/>
-              <a:t>27/10/2022</a:t>
+              <a:t>31/10/2022</a:t>
             </a:fld>
             <a:endParaRPr lang="en-AU"/>
           </a:p>
@@ -1141,7 +1226,7 @@
           <a:p>
             <a:fld id="{12A724B5-2D60-411B-A104-D6B0EC565BD0}" type="datetimeFigureOut">
               <a:rPr lang="en-AU" smtClean="0"/>
-              <a:t>27/10/2022</a:t>
+              <a:t>31/10/2022</a:t>
             </a:fld>
             <a:endParaRPr lang="en-AU"/>
           </a:p>
@@ -1341,7 +1426,7 @@
           <a:p>
             <a:fld id="{12A724B5-2D60-411B-A104-D6B0EC565BD0}" type="datetimeFigureOut">
               <a:rPr lang="en-AU" smtClean="0"/>
-              <a:t>27/10/2022</a:t>
+              <a:t>31/10/2022</a:t>
             </a:fld>
             <a:endParaRPr lang="en-AU"/>
           </a:p>
@@ -1617,7 +1702,7 @@
           <a:p>
             <a:fld id="{12A724B5-2D60-411B-A104-D6B0EC565BD0}" type="datetimeFigureOut">
               <a:rPr lang="en-AU" smtClean="0"/>
-              <a:t>27/10/2022</a:t>
+              <a:t>31/10/2022</a:t>
             </a:fld>
             <a:endParaRPr lang="en-AU"/>
           </a:p>
@@ -1885,7 +1970,7 @@
           <a:p>
             <a:fld id="{12A724B5-2D60-411B-A104-D6B0EC565BD0}" type="datetimeFigureOut">
               <a:rPr lang="en-AU" smtClean="0"/>
-              <a:t>27/10/2022</a:t>
+              <a:t>31/10/2022</a:t>
             </a:fld>
             <a:endParaRPr lang="en-AU"/>
           </a:p>
@@ -2300,7 +2385,7 @@
           <a:p>
             <a:fld id="{12A724B5-2D60-411B-A104-D6B0EC565BD0}" type="datetimeFigureOut">
               <a:rPr lang="en-AU" smtClean="0"/>
-              <a:t>27/10/2022</a:t>
+              <a:t>31/10/2022</a:t>
             </a:fld>
             <a:endParaRPr lang="en-AU"/>
           </a:p>
@@ -2442,7 +2527,7 @@
           <a:p>
             <a:fld id="{12A724B5-2D60-411B-A104-D6B0EC565BD0}" type="datetimeFigureOut">
               <a:rPr lang="en-AU" smtClean="0"/>
-              <a:t>27/10/2022</a:t>
+              <a:t>31/10/2022</a:t>
             </a:fld>
             <a:endParaRPr lang="en-AU"/>
           </a:p>
@@ -2555,7 +2640,7 @@
           <a:p>
             <a:fld id="{12A724B5-2D60-411B-A104-D6B0EC565BD0}" type="datetimeFigureOut">
               <a:rPr lang="en-AU" smtClean="0"/>
-              <a:t>27/10/2022</a:t>
+              <a:t>31/10/2022</a:t>
             </a:fld>
             <a:endParaRPr lang="en-AU"/>
           </a:p>
@@ -2868,7 +2953,7 @@
           <a:p>
             <a:fld id="{12A724B5-2D60-411B-A104-D6B0EC565BD0}" type="datetimeFigureOut">
               <a:rPr lang="en-AU" smtClean="0"/>
-              <a:t>27/10/2022</a:t>
+              <a:t>31/10/2022</a:t>
             </a:fld>
             <a:endParaRPr lang="en-AU"/>
           </a:p>
@@ -3157,7 +3242,7 @@
           <a:p>
             <a:fld id="{12A724B5-2D60-411B-A104-D6B0EC565BD0}" type="datetimeFigureOut">
               <a:rPr lang="en-AU" smtClean="0"/>
-              <a:t>27/10/2022</a:t>
+              <a:t>31/10/2022</a:t>
             </a:fld>
             <a:endParaRPr lang="en-AU"/>
           </a:p>
@@ -3400,7 +3485,7 @@
           <a:p>
             <a:fld id="{12A724B5-2D60-411B-A104-D6B0EC565BD0}" type="datetimeFigureOut">
               <a:rPr lang="en-AU" smtClean="0"/>
-              <a:t>27/10/2022</a:t>
+              <a:t>31/10/2022</a:t>
             </a:fld>
             <a:endParaRPr lang="en-AU"/>
           </a:p>
@@ -4215,6 +4300,216 @@
     <p:extLst>
       <p:ext uri="{BB962C8B-B14F-4D97-AF65-F5344CB8AC3E}">
         <p14:creationId xmlns:p14="http://schemas.microsoft.com/office/powerpoint/2010/main" val="398941835"/>
+      </p:ext>
+    </p:extLst>
+  </p:cSld>
+  <p:clrMapOvr>
+    <a:masterClrMapping/>
+  </p:clrMapOvr>
+</p:sld>
+</file>
+
+<file path=ppt/slides/slide5.xml><?xml version="1.0" encoding="utf-8"?>
+<p:sld xmlns:a="http://schemas.openxmlformats.org/drawingml/2006/main" xmlns:r="http://schemas.openxmlformats.org/officeDocument/2006/relationships" xmlns:p="http://schemas.openxmlformats.org/presentationml/2006/main">
+  <p:cSld>
+    <p:spTree>
+      <p:nvGrpSpPr>
+        <p:cNvPr id="1" name=""/>
+        <p:cNvGrpSpPr/>
+        <p:nvPr/>
+      </p:nvGrpSpPr>
+      <p:grpSpPr>
+        <a:xfrm>
+          <a:off x="0" y="0"/>
+          <a:ext cx="0" cy="0"/>
+          <a:chOff x="0" y="0"/>
+          <a:chExt cx="0" cy="0"/>
+        </a:xfrm>
+      </p:grpSpPr>
+      <p:sp>
+        <p:nvSpPr>
+          <p:cNvPr id="2" name="Title 1">
+            <a:extLst>
+              <a:ext uri="{FF2B5EF4-FFF2-40B4-BE49-F238E27FC236}">
+                <a16:creationId xmlns:a16="http://schemas.microsoft.com/office/drawing/2014/main" id="{F611EA54-5849-EB98-03E4-E66462496CF3}"/>
+              </a:ext>
+            </a:extLst>
+          </p:cNvPr>
+          <p:cNvSpPr>
+            <a:spLocks noGrp="1"/>
+          </p:cNvSpPr>
+          <p:nvPr>
+            <p:ph type="title"/>
+          </p:nvPr>
+        </p:nvSpPr>
+        <p:spPr/>
+        <p:txBody>
+          <a:bodyPr/>
+          <a:lstStyle/>
+          <a:p>
+            <a:r>
+              <a:rPr lang="en-AU" dirty="0"/>
+              <a:t>Task Allocation and time schedule</a:t>
+            </a:r>
+          </a:p>
+        </p:txBody>
+      </p:sp>
+      <p:sp>
+        <p:nvSpPr>
+          <p:cNvPr id="3" name="Content Placeholder 2">
+            <a:extLst>
+              <a:ext uri="{FF2B5EF4-FFF2-40B4-BE49-F238E27FC236}">
+                <a16:creationId xmlns:a16="http://schemas.microsoft.com/office/drawing/2014/main" id="{7652AF93-97EE-16A7-8C9A-586F91C70E2F}"/>
+              </a:ext>
+            </a:extLst>
+          </p:cNvPr>
+          <p:cNvSpPr>
+            <a:spLocks noGrp="1"/>
+          </p:cNvSpPr>
+          <p:nvPr>
+            <p:ph idx="1"/>
+          </p:nvPr>
+        </p:nvSpPr>
+        <p:spPr/>
+        <p:txBody>
+          <a:bodyPr>
+            <a:normAutofit lnSpcReduction="10000"/>
+          </a:bodyPr>
+          <a:lstStyle/>
+          <a:p>
+            <a:r>
+              <a:rPr lang="en-GB" b="0" i="0" dirty="0">
+                <a:solidFill>
+                  <a:srgbClr val="1D1C1D"/>
+                </a:solidFill>
+                <a:effectLst/>
+                <a:latin typeface="Slack-Lato"/>
+              </a:rPr>
+              <a:t>1. presentation ppt and readme file   </a:t>
+            </a:r>
+          </a:p>
+          <a:p>
+            <a:r>
+              <a:rPr lang="en-GB" b="0" i="0" dirty="0">
+                <a:solidFill>
+                  <a:srgbClr val="1D1C1D"/>
+                </a:solidFill>
+                <a:effectLst/>
+                <a:latin typeface="Slack-Lato"/>
+              </a:rPr>
+              <a:t>2. coding    </a:t>
+            </a:r>
+          </a:p>
+          <a:p>
+            <a:r>
+              <a:rPr lang="en-GB" b="0" i="0" dirty="0">
+                <a:solidFill>
+                  <a:srgbClr val="1D1C1D"/>
+                </a:solidFill>
+                <a:effectLst/>
+                <a:latin typeface="Slack-Lato"/>
+              </a:rPr>
+              <a:t>3. extra libraries research and usage into the code</a:t>
+            </a:r>
+          </a:p>
+          <a:p>
+            <a:endParaRPr lang="en-GB" dirty="0">
+              <a:solidFill>
+                <a:srgbClr val="1D1C1D"/>
+              </a:solidFill>
+              <a:latin typeface="Slack-Lato"/>
+            </a:endParaRPr>
+          </a:p>
+          <a:p>
+            <a:endParaRPr lang="en-GB" dirty="0">
+              <a:solidFill>
+                <a:srgbClr val="1D1C1D"/>
+              </a:solidFill>
+              <a:latin typeface="Slack-Lato"/>
+            </a:endParaRPr>
+          </a:p>
+          <a:p>
+            <a:r>
+              <a:rPr lang="en-GB" sz="2000" dirty="0">
+                <a:solidFill>
+                  <a:srgbClr val="1D1C1D"/>
+                </a:solidFill>
+                <a:latin typeface="Slack-Lato"/>
+              </a:rPr>
+              <a:t>Presentation Day: 7</a:t>
+            </a:r>
+            <a:r>
+              <a:rPr lang="en-GB" sz="2000" baseline="30000" dirty="0">
+                <a:solidFill>
+                  <a:srgbClr val="1D1C1D"/>
+                </a:solidFill>
+                <a:latin typeface="Slack-Lato"/>
+              </a:rPr>
+              <a:t>th</a:t>
+            </a:r>
+            <a:r>
+              <a:rPr lang="en-GB" sz="2000" dirty="0">
+                <a:solidFill>
+                  <a:srgbClr val="1D1C1D"/>
+                </a:solidFill>
+                <a:latin typeface="Slack-Lato"/>
+              </a:rPr>
+              <a:t> Nov</a:t>
+            </a:r>
+          </a:p>
+          <a:p>
+            <a:r>
+              <a:rPr lang="en-GB" sz="2000" dirty="0">
+                <a:solidFill>
+                  <a:srgbClr val="1D1C1D"/>
+                </a:solidFill>
+                <a:latin typeface="Slack-Lato"/>
+              </a:rPr>
+              <a:t>First Version: Wednesday 2nd Nov</a:t>
+            </a:r>
+          </a:p>
+          <a:p>
+            <a:r>
+              <a:rPr lang="en-GB" sz="2000" dirty="0">
+                <a:solidFill>
+                  <a:srgbClr val="1D1C1D"/>
+                </a:solidFill>
+                <a:latin typeface="Slack-Lato"/>
+              </a:rPr>
+              <a:t>Discussion: Thursday</a:t>
+            </a:r>
+          </a:p>
+          <a:p>
+            <a:r>
+              <a:rPr lang="en-GB" sz="2000" dirty="0">
+                <a:solidFill>
+                  <a:srgbClr val="1D1C1D"/>
+                </a:solidFill>
+                <a:latin typeface="Slack-Lato"/>
+              </a:rPr>
+              <a:t>Second Version: Friday</a:t>
+            </a:r>
+          </a:p>
+          <a:p>
+            <a:r>
+              <a:rPr lang="en-GB" sz="2000" dirty="0">
+                <a:solidFill>
+                  <a:srgbClr val="1D1C1D"/>
+                </a:solidFill>
+                <a:latin typeface="Slack-Lato"/>
+              </a:rPr>
+              <a:t>Final discussion and modification: Sat night or Sunday night</a:t>
+            </a:r>
+          </a:p>
+          <a:p>
+            <a:endParaRPr lang="en-AU" dirty="0"/>
+          </a:p>
+        </p:txBody>
+      </p:sp>
+    </p:spTree>
+    <p:extLst>
+      <p:ext uri="{BB962C8B-B14F-4D97-AF65-F5344CB8AC3E}">
+        <p14:creationId xmlns:p14="http://schemas.microsoft.com/office/powerpoint/2010/main" val="3658046662"/>
       </p:ext>
     </p:extLst>
   </p:cSld>

</xml_diff>

<commit_message>
correct the csv file data; write the function to compare dca and lump sum inv
</commit_message>
<xml_diff>
--- a/Presentation.pptx
+++ b/Presentation.pptx
@@ -201,7 +201,7 @@
           <a:p>
             <a:fld id="{732DA226-17C0-408D-A41F-E8091E262BB0}" type="datetimeFigureOut">
               <a:rPr lang="en-AU" smtClean="0"/>
-              <a:t>31/10/2022</a:t>
+              <a:t>4/11/2022</a:t>
             </a:fld>
             <a:endParaRPr lang="en-AU"/>
           </a:p>
@@ -531,7 +531,7 @@
                 <a:effectLst/>
                 <a:latin typeface="Slack-Lato"/>
               </a:rPr>
-              <a:t>BTCUSD","price</a:t>
+              <a:t>BTCUSD",“Close</a:t>
             </a:r>
             <a:r>
               <a:rPr lang="en-GB" b="0" i="0" dirty="0">
@@ -543,6 +543,67 @@
               </a:rPr>
               <a:t>", DATE(2009,1,3), DATE(2022,10,26), "DAILY")</a:t>
             </a:r>
+          </a:p>
+          <a:p>
+            <a:endParaRPr lang="en-GB" b="0" i="0" dirty="0">
+              <a:solidFill>
+                <a:srgbClr val="1D1C1D"/>
+              </a:solidFill>
+              <a:effectLst/>
+              <a:latin typeface="Slack-Lato"/>
+            </a:endParaRPr>
+          </a:p>
+          <a:p>
+            <a:pPr marL="0" marR="0" lvl="0" indent="0" algn="l" defTabSz="914400" rtl="0" eaLnBrk="1" fontAlgn="auto" latinLnBrk="0" hangingPunct="1">
+              <a:lnSpc>
+                <a:spcPct val="100000"/>
+              </a:lnSpc>
+              <a:spcBef>
+                <a:spcPts val="0"/>
+              </a:spcBef>
+              <a:spcAft>
+                <a:spcPts val="0"/>
+              </a:spcAft>
+              <a:buClrTx/>
+              <a:buSzTx/>
+              <a:buFontTx/>
+              <a:buNone/>
+              <a:tabLst/>
+              <a:defRPr/>
+            </a:pPr>
+            <a:r>
+              <a:rPr lang="en-GB" b="0" i="0" dirty="0">
+                <a:solidFill>
+                  <a:srgbClr val="1D1C1D"/>
+                </a:solidFill>
+                <a:effectLst/>
+                <a:latin typeface="Slack-Lato"/>
+              </a:rPr>
+              <a:t>=GOOGLEFINANCE("</a:t>
+            </a:r>
+            <a:r>
+              <a:rPr lang="en-GB" b="0" i="0" dirty="0" err="1">
+                <a:solidFill>
+                  <a:srgbClr val="1D1C1D"/>
+                </a:solidFill>
+                <a:effectLst/>
+                <a:latin typeface="Slack-Lato"/>
+              </a:rPr>
+              <a:t>BNBUSD",“Close</a:t>
+            </a:r>
+            <a:r>
+              <a:rPr lang="en-GB" b="0" i="0" dirty="0">
+                <a:solidFill>
+                  <a:srgbClr val="1D1C1D"/>
+                </a:solidFill>
+                <a:effectLst/>
+                <a:latin typeface="Slack-Lato"/>
+              </a:rPr>
+              <a:t>", DATE(2009,1,3), DATE(2022,10,26), "DAILY")</a:t>
+            </a:r>
+            <a:endParaRPr lang="en-AU" dirty="0"/>
+          </a:p>
+          <a:p>
             <a:endParaRPr lang="en-AU" dirty="0"/>
           </a:p>
         </p:txBody>
@@ -816,7 +877,7 @@
           <a:p>
             <a:fld id="{12A724B5-2D60-411B-A104-D6B0EC565BD0}" type="datetimeFigureOut">
               <a:rPr lang="en-AU" smtClean="0"/>
-              <a:t>31/10/2022</a:t>
+              <a:t>4/11/2022</a:t>
             </a:fld>
             <a:endParaRPr lang="en-AU"/>
           </a:p>
@@ -1016,7 +1077,7 @@
           <a:p>
             <a:fld id="{12A724B5-2D60-411B-A104-D6B0EC565BD0}" type="datetimeFigureOut">
               <a:rPr lang="en-AU" smtClean="0"/>
-              <a:t>31/10/2022</a:t>
+              <a:t>4/11/2022</a:t>
             </a:fld>
             <a:endParaRPr lang="en-AU"/>
           </a:p>
@@ -1226,7 +1287,7 @@
           <a:p>
             <a:fld id="{12A724B5-2D60-411B-A104-D6B0EC565BD0}" type="datetimeFigureOut">
               <a:rPr lang="en-AU" smtClean="0"/>
-              <a:t>31/10/2022</a:t>
+              <a:t>4/11/2022</a:t>
             </a:fld>
             <a:endParaRPr lang="en-AU"/>
           </a:p>
@@ -1426,7 +1487,7 @@
           <a:p>
             <a:fld id="{12A724B5-2D60-411B-A104-D6B0EC565BD0}" type="datetimeFigureOut">
               <a:rPr lang="en-AU" smtClean="0"/>
-              <a:t>31/10/2022</a:t>
+              <a:t>4/11/2022</a:t>
             </a:fld>
             <a:endParaRPr lang="en-AU"/>
           </a:p>
@@ -1702,7 +1763,7 @@
           <a:p>
             <a:fld id="{12A724B5-2D60-411B-A104-D6B0EC565BD0}" type="datetimeFigureOut">
               <a:rPr lang="en-AU" smtClean="0"/>
-              <a:t>31/10/2022</a:t>
+              <a:t>4/11/2022</a:t>
             </a:fld>
             <a:endParaRPr lang="en-AU"/>
           </a:p>
@@ -1970,7 +2031,7 @@
           <a:p>
             <a:fld id="{12A724B5-2D60-411B-A104-D6B0EC565BD0}" type="datetimeFigureOut">
               <a:rPr lang="en-AU" smtClean="0"/>
-              <a:t>31/10/2022</a:t>
+              <a:t>4/11/2022</a:t>
             </a:fld>
             <a:endParaRPr lang="en-AU"/>
           </a:p>
@@ -2385,7 +2446,7 @@
           <a:p>
             <a:fld id="{12A724B5-2D60-411B-A104-D6B0EC565BD0}" type="datetimeFigureOut">
               <a:rPr lang="en-AU" smtClean="0"/>
-              <a:t>31/10/2022</a:t>
+              <a:t>4/11/2022</a:t>
             </a:fld>
             <a:endParaRPr lang="en-AU"/>
           </a:p>
@@ -2527,7 +2588,7 @@
           <a:p>
             <a:fld id="{12A724B5-2D60-411B-A104-D6B0EC565BD0}" type="datetimeFigureOut">
               <a:rPr lang="en-AU" smtClean="0"/>
-              <a:t>31/10/2022</a:t>
+              <a:t>4/11/2022</a:t>
             </a:fld>
             <a:endParaRPr lang="en-AU"/>
           </a:p>
@@ -2640,7 +2701,7 @@
           <a:p>
             <a:fld id="{12A724B5-2D60-411B-A104-D6B0EC565BD0}" type="datetimeFigureOut">
               <a:rPr lang="en-AU" smtClean="0"/>
-              <a:t>31/10/2022</a:t>
+              <a:t>4/11/2022</a:t>
             </a:fld>
             <a:endParaRPr lang="en-AU"/>
           </a:p>
@@ -2953,7 +3014,7 @@
           <a:p>
             <a:fld id="{12A724B5-2D60-411B-A104-D6B0EC565BD0}" type="datetimeFigureOut">
               <a:rPr lang="en-AU" smtClean="0"/>
-              <a:t>31/10/2022</a:t>
+              <a:t>4/11/2022</a:t>
             </a:fld>
             <a:endParaRPr lang="en-AU"/>
           </a:p>
@@ -3242,7 +3303,7 @@
           <a:p>
             <a:fld id="{12A724B5-2D60-411B-A104-D6B0EC565BD0}" type="datetimeFigureOut">
               <a:rPr lang="en-AU" smtClean="0"/>
-              <a:t>31/10/2022</a:t>
+              <a:t>4/11/2022</a:t>
             </a:fld>
             <a:endParaRPr lang="en-AU"/>
           </a:p>
@@ -3485,7 +3546,7 @@
           <a:p>
             <a:fld id="{12A724B5-2D60-411B-A104-D6B0EC565BD0}" type="datetimeFigureOut">
               <a:rPr lang="en-AU" smtClean="0"/>
-              <a:t>31/10/2022</a:t>
+              <a:t>4/11/2022</a:t>
             </a:fld>
             <a:endParaRPr lang="en-AU"/>
           </a:p>
@@ -4201,7 +4262,70 @@
           </a:p>
           <a:p>
             <a:pPr lvl="1"/>
-            <a:endParaRPr lang="en-AU">
+            <a:endParaRPr lang="en-AU" b="0" i="0" dirty="0">
+              <a:solidFill>
+                <a:srgbClr val="1D1C1D"/>
+              </a:solidFill>
+              <a:effectLst/>
+              <a:latin typeface="Slack-Lato"/>
+            </a:endParaRPr>
+          </a:p>
+          <a:p>
+            <a:pPr lvl="1"/>
+            <a:r>
+              <a:rPr lang="en-GB" b="0" i="0" dirty="0">
+                <a:solidFill>
+                  <a:srgbClr val="1D1C1D"/>
+                </a:solidFill>
+                <a:effectLst/>
+                <a:latin typeface="Slack-Lato"/>
+              </a:rPr>
+              <a:t>=GOOGLEFINANCE("</a:t>
+            </a:r>
+            <a:r>
+              <a:rPr lang="en-GB" b="0" i="0" dirty="0" err="1">
+                <a:solidFill>
+                  <a:srgbClr val="1D1C1D"/>
+                </a:solidFill>
+                <a:effectLst/>
+                <a:latin typeface="Slack-Lato"/>
+              </a:rPr>
+              <a:t>BNBUSD",“Close</a:t>
+            </a:r>
+            <a:r>
+              <a:rPr lang="en-GB" b="0" i="0" dirty="0">
+                <a:solidFill>
+                  <a:srgbClr val="1D1C1D"/>
+                </a:solidFill>
+                <a:effectLst/>
+                <a:latin typeface="Slack-Lato"/>
+              </a:rPr>
+              <a:t>", DATE(2009,1,3), DATE(2022,10,26), "DAILY")</a:t>
+            </a:r>
+            <a:endParaRPr lang="en-AU" dirty="0"/>
+          </a:p>
+          <a:p>
+            <a:pPr lvl="1"/>
+            <a:endParaRPr lang="en-AU" b="0" i="0" dirty="0">
+              <a:solidFill>
+                <a:srgbClr val="1D1C1D"/>
+              </a:solidFill>
+              <a:effectLst/>
+              <a:latin typeface="Slack-Lato"/>
+            </a:endParaRPr>
+          </a:p>
+          <a:p>
+            <a:pPr lvl="1"/>
+            <a:endParaRPr lang="en-AU" dirty="0">
+              <a:solidFill>
+                <a:srgbClr val="1D1C1D"/>
+              </a:solidFill>
+              <a:latin typeface="Slack-Lato"/>
+            </a:endParaRPr>
+          </a:p>
+          <a:p>
+            <a:pPr lvl="1"/>
+            <a:endParaRPr lang="en-AU" dirty="0">
               <a:solidFill>
                 <a:srgbClr val="1D1C1D"/>
               </a:solidFill>

</xml_diff>